<commit_message>
few additions to boosting
</commit_message>
<xml_diff>
--- a/slides/PredictiveAI_2.pptx
+++ b/slides/PredictiveAI_2.pptx
@@ -5,7 +5,7 @@
     <p:sldMasterId id="2147483648" r:id="rId1"/>
   </p:sldMasterIdLst>
   <p:notesMasterIdLst>
-    <p:notesMasterId r:id="rId26"/>
+    <p:notesMasterId r:id="rId27"/>
   </p:notesMasterIdLst>
   <p:sldIdLst>
     <p:sldId id="292" r:id="rId2"/>
@@ -29,9 +29,10 @@
     <p:sldId id="693" r:id="rId20"/>
     <p:sldId id="694" r:id="rId21"/>
     <p:sldId id="695" r:id="rId22"/>
-    <p:sldId id="309" r:id="rId23"/>
-    <p:sldId id="719" r:id="rId24"/>
-    <p:sldId id="717" r:id="rId25"/>
+    <p:sldId id="720" r:id="rId23"/>
+    <p:sldId id="309" r:id="rId24"/>
+    <p:sldId id="719" r:id="rId25"/>
+    <p:sldId id="717" r:id="rId26"/>
   </p:sldIdLst>
   <p:sldSz cx="12192000" cy="6858000"/>
   <p:notesSz cx="6858000" cy="9144000"/>
@@ -141,7 +142,7 @@
 <file path=ppt/revisionInfo.xml><?xml version="1.0" encoding="utf-8"?>
 <p1510:revInfo xmlns:a="http://schemas.openxmlformats.org/drawingml/2006/main" xmlns:r="http://schemas.openxmlformats.org/officeDocument/2006/relationships" xmlns:p1510="http://schemas.microsoft.com/office/powerpoint/2015/10/main">
   <p1510:revLst>
-    <p1510:client id="{830C4285-055C-48D2-8C66-83117252A4A7}" v="10" dt="2024-03-14T14:37:54.590"/>
+    <p1510:client id="{830C4285-055C-48D2-8C66-83117252A4A7}" v="11" dt="2024-03-25T18:19:13.904"/>
   </p1510:revLst>
 </p1510:revInfo>
 </file>
@@ -150,8 +151,8 @@
 <pc:chgInfo xmlns:a="http://schemas.openxmlformats.org/drawingml/2006/main" xmlns:r="http://schemas.openxmlformats.org/officeDocument/2006/relationships" xmlns:ac="http://schemas.microsoft.com/office/drawing/2013/main/command" xmlns:pc="http://schemas.microsoft.com/office/powerpoint/2013/main/command">
   <pc:docChgLst>
     <pc:chgData name="Wick, Felix" userId="85efb633-acf6-425d-a271-4f136bfa2fb0" providerId="ADAL" clId="{830C4285-055C-48D2-8C66-83117252A4A7}"/>
-    <pc:docChg chg="undo custSel delSld modSld sldOrd">
-      <pc:chgData name="Wick, Felix" userId="85efb633-acf6-425d-a271-4f136bfa2fb0" providerId="ADAL" clId="{830C4285-055C-48D2-8C66-83117252A4A7}" dt="2024-03-14T14:41:39.483" v="125"/>
+    <pc:docChg chg="undo custSel addSld delSld modSld sldOrd">
+      <pc:chgData name="Wick, Felix" userId="85efb633-acf6-425d-a271-4f136bfa2fb0" providerId="ADAL" clId="{830C4285-055C-48D2-8C66-83117252A4A7}" dt="2024-03-25T18:24:45.181" v="248" actId="20577"/>
       <pc:docMkLst>
         <pc:docMk/>
       </pc:docMkLst>
@@ -357,6 +358,21 @@
           <pc:sldMk cId="96379830" sldId="684"/>
         </pc:sldMkLst>
       </pc:sldChg>
+      <pc:sldChg chg="modSp mod">
+        <pc:chgData name="Wick, Felix" userId="85efb633-acf6-425d-a271-4f136bfa2fb0" providerId="ADAL" clId="{830C4285-055C-48D2-8C66-83117252A4A7}" dt="2024-03-25T18:24:45.181" v="248" actId="20577"/>
+        <pc:sldMkLst>
+          <pc:docMk/>
+          <pc:sldMk cId="2935907153" sldId="694"/>
+        </pc:sldMkLst>
+        <pc:spChg chg="mod">
+          <ac:chgData name="Wick, Felix" userId="85efb633-acf6-425d-a271-4f136bfa2fb0" providerId="ADAL" clId="{830C4285-055C-48D2-8C66-83117252A4A7}" dt="2024-03-25T18:24:45.181" v="248" actId="20577"/>
+          <ac:spMkLst>
+            <pc:docMk/>
+            <pc:sldMk cId="2935907153" sldId="694"/>
+            <ac:spMk id="3" creationId="{5C809707-E1B1-CACB-24E7-02F32336AC77}"/>
+          </ac:spMkLst>
+        </pc:spChg>
+      </pc:sldChg>
       <pc:sldChg chg="del">
         <pc:chgData name="Wick, Felix" userId="85efb633-acf6-425d-a271-4f136bfa2fb0" providerId="ADAL" clId="{830C4285-055C-48D2-8C66-83117252A4A7}" dt="2024-03-13T06:39:42.198" v="29" actId="47"/>
         <pc:sldMkLst>
@@ -463,6 +479,45 @@
           <pc:docMk/>
           <pc:sldMk cId="1391828573" sldId="720"/>
         </pc:sldMkLst>
+      </pc:sldChg>
+      <pc:sldChg chg="addSp delSp modSp new mod modClrScheme chgLayout">
+        <pc:chgData name="Wick, Felix" userId="85efb633-acf6-425d-a271-4f136bfa2fb0" providerId="ADAL" clId="{830C4285-055C-48D2-8C66-83117252A4A7}" dt="2024-03-25T18:19:13.904" v="129"/>
+        <pc:sldMkLst>
+          <pc:docMk/>
+          <pc:sldMk cId="2404063692" sldId="720"/>
+        </pc:sldMkLst>
+        <pc:spChg chg="del">
+          <ac:chgData name="Wick, Felix" userId="85efb633-acf6-425d-a271-4f136bfa2fb0" providerId="ADAL" clId="{830C4285-055C-48D2-8C66-83117252A4A7}" dt="2024-03-25T18:19:09.314" v="127" actId="478"/>
+          <ac:spMkLst>
+            <pc:docMk/>
+            <pc:sldMk cId="2404063692" sldId="720"/>
+            <ac:spMk id="2" creationId="{B4EF31EB-E8E4-90C3-FF23-FC256EC3D2A7}"/>
+          </ac:spMkLst>
+        </pc:spChg>
+        <pc:spChg chg="del">
+          <ac:chgData name="Wick, Felix" userId="85efb633-acf6-425d-a271-4f136bfa2fb0" providerId="ADAL" clId="{830C4285-055C-48D2-8C66-83117252A4A7}" dt="2024-03-25T18:19:11.800" v="128" actId="700"/>
+          <ac:spMkLst>
+            <pc:docMk/>
+            <pc:sldMk cId="2404063692" sldId="720"/>
+            <ac:spMk id="3" creationId="{5D82DBE4-1931-E187-3141-DB65B018CE4C}"/>
+          </ac:spMkLst>
+        </pc:spChg>
+        <pc:spChg chg="mod ord">
+          <ac:chgData name="Wick, Felix" userId="85efb633-acf6-425d-a271-4f136bfa2fb0" providerId="ADAL" clId="{830C4285-055C-48D2-8C66-83117252A4A7}" dt="2024-03-25T18:19:11.800" v="128" actId="700"/>
+          <ac:spMkLst>
+            <pc:docMk/>
+            <pc:sldMk cId="2404063692" sldId="720"/>
+            <ac:spMk id="4" creationId="{2EA1AED6-5238-21B7-B855-D4490187184E}"/>
+          </ac:spMkLst>
+        </pc:spChg>
+        <pc:picChg chg="add">
+          <ac:chgData name="Wick, Felix" userId="85efb633-acf6-425d-a271-4f136bfa2fb0" providerId="ADAL" clId="{830C4285-055C-48D2-8C66-83117252A4A7}" dt="2024-03-25T18:19:13.904" v="129"/>
+          <ac:picMkLst>
+            <pc:docMk/>
+            <pc:sldMk cId="2404063692" sldId="720"/>
+            <ac:picMk id="1026" creationId="{185C8C33-5975-C3CD-7DBE-9F6CC0596D98}"/>
+          </ac:picMkLst>
+        </pc:picChg>
       </pc:sldChg>
       <pc:sldChg chg="del">
         <pc:chgData name="Wick, Felix" userId="85efb633-acf6-425d-a271-4f136bfa2fb0" providerId="ADAL" clId="{830C4285-055C-48D2-8C66-83117252A4A7}" dt="2024-03-13T06:39:28.666" v="3" actId="47"/>
@@ -2233,7 +2288,7 @@
           <a:p>
             <a:fld id="{7B97FCB6-4C2D-C04F-941C-940A5CA28665}" type="datetimeFigureOut">
               <a:rPr lang="en-DE" smtClean="0"/>
-              <a:t>03/14/2024</a:t>
+              <a:t>03/25/2024</a:t>
             </a:fld>
             <a:endParaRPr lang="en-DE"/>
           </a:p>
@@ -2650,7 +2705,7 @@
           <a:p>
             <a:fld id="{C549D344-DF28-3942-A533-7BAE51F54729}" type="datetime1">
               <a:rPr lang="de-DE" smtClean="0"/>
-              <a:t>14.03.2024</a:t>
+              <a:t>25.03.2024</a:t>
             </a:fld>
             <a:endParaRPr lang="en-DE"/>
           </a:p>
@@ -2850,7 +2905,7 @@
           <a:p>
             <a:fld id="{B086E2CF-DFBF-D04E-B5DA-5682BEFB4DDF}" type="datetime1">
               <a:rPr lang="de-DE" smtClean="0"/>
-              <a:t>14.03.2024</a:t>
+              <a:t>25.03.2024</a:t>
             </a:fld>
             <a:endParaRPr lang="en-DE"/>
           </a:p>
@@ -3060,7 +3115,7 @@
           <a:p>
             <a:fld id="{535E2105-910D-C747-9EAC-FAEE1AE97756}" type="datetime1">
               <a:rPr lang="de-DE" smtClean="0"/>
-              <a:t>14.03.2024</a:t>
+              <a:t>25.03.2024</a:t>
             </a:fld>
             <a:endParaRPr lang="en-DE"/>
           </a:p>
@@ -3260,7 +3315,7 @@
           <a:p>
             <a:fld id="{0D5BD470-EF8A-9248-A0C9-F868A9D8F50A}" type="datetime1">
               <a:rPr lang="de-DE" smtClean="0"/>
-              <a:t>14.03.2024</a:t>
+              <a:t>25.03.2024</a:t>
             </a:fld>
             <a:endParaRPr lang="en-DE"/>
           </a:p>
@@ -3536,7 +3591,7 @@
           <a:p>
             <a:fld id="{7B12F34F-4BA0-4C4C-95F7-3AE797B9DBCA}" type="datetime1">
               <a:rPr lang="de-DE" smtClean="0"/>
-              <a:t>14.03.2024</a:t>
+              <a:t>25.03.2024</a:t>
             </a:fld>
             <a:endParaRPr lang="en-DE"/>
           </a:p>
@@ -3804,7 +3859,7 @@
           <a:p>
             <a:fld id="{C522E529-A223-9F44-93E9-FAF3838F58DD}" type="datetime1">
               <a:rPr lang="de-DE" smtClean="0"/>
-              <a:t>14.03.2024</a:t>
+              <a:t>25.03.2024</a:t>
             </a:fld>
             <a:endParaRPr lang="en-DE"/>
           </a:p>
@@ -4219,7 +4274,7 @@
           <a:p>
             <a:fld id="{4DF85873-DFC3-7147-8CF2-B93516293BD0}" type="datetime1">
               <a:rPr lang="de-DE" smtClean="0"/>
-              <a:t>14.03.2024</a:t>
+              <a:t>25.03.2024</a:t>
             </a:fld>
             <a:endParaRPr lang="en-DE"/>
           </a:p>
@@ -4361,7 +4416,7 @@
           <a:p>
             <a:fld id="{9FC8FD75-28F4-1141-976A-ED0F1E51F5FE}" type="datetime1">
               <a:rPr lang="de-DE" smtClean="0"/>
-              <a:t>14.03.2024</a:t>
+              <a:t>25.03.2024</a:t>
             </a:fld>
             <a:endParaRPr lang="en-DE"/>
           </a:p>
@@ -4474,7 +4529,7 @@
           <a:p>
             <a:fld id="{A5CF1818-702C-9249-923B-5C9832600DF4}" type="datetime1">
               <a:rPr lang="de-DE" smtClean="0"/>
-              <a:t>14.03.2024</a:t>
+              <a:t>25.03.2024</a:t>
             </a:fld>
             <a:endParaRPr lang="en-DE"/>
           </a:p>
@@ -4787,7 +4842,7 @@
           <a:p>
             <a:fld id="{70703230-1F3D-6648-88BD-E31F8313AC65}" type="datetime1">
               <a:rPr lang="de-DE" smtClean="0"/>
-              <a:t>14.03.2024</a:t>
+              <a:t>25.03.2024</a:t>
             </a:fld>
             <a:endParaRPr lang="en-DE"/>
           </a:p>
@@ -5076,7 +5131,7 @@
           <a:p>
             <a:fld id="{EE1F903E-BE95-4947-BFB2-6309249837BB}" type="datetime1">
               <a:rPr lang="de-DE" smtClean="0"/>
-              <a:t>14.03.2024</a:t>
+              <a:t>25.03.2024</a:t>
             </a:fld>
             <a:endParaRPr lang="en-DE"/>
           </a:p>
@@ -5319,7 +5374,7 @@
           <a:p>
             <a:fld id="{18698627-0DA6-6B48-8AB9-BEA12C38C21E}" type="datetime1">
               <a:rPr lang="de-DE" smtClean="0"/>
-              <a:t>14.03.2024</a:t>
+              <a:t>25.03.2024</a:t>
             </a:fld>
             <a:endParaRPr lang="en-DE"/>
           </a:p>
@@ -10347,7 +10402,12 @@
             <p:ph idx="1"/>
           </p:nvPr>
         </p:nvSpPr>
-        <p:spPr/>
+        <p:spPr>
+          <a:xfrm>
+            <a:off x="838200" y="1762896"/>
+            <a:ext cx="10941908" cy="4593453"/>
+          </a:xfrm>
+        </p:spPr>
         <p:txBody>
           <a:bodyPr>
             <a:normAutofit fontScale="85000" lnSpcReduction="20000"/>
@@ -10484,6 +10544,20 @@
               <a:rPr lang="en-DE" dirty="0"/>
               <a:t>ypically, use simple, high-bias methods as individual models</a:t>
             </a:r>
+            <a:r>
+              <a:rPr lang="en-GB" dirty="0"/>
+              <a:t> (e.g., small decision trees)</a:t>
+            </a:r>
+          </a:p>
+          <a:p>
+            <a:pPr marL="0" indent="0">
+              <a:buNone/>
+            </a:pPr>
+            <a:r>
+              <a:rPr lang="en-GB" dirty="0"/>
+              <a:t>most prominent: AdaBoost, Gradient Boosting</a:t>
+            </a:r>
+            <a:endParaRPr lang="en-DE" dirty="0"/>
           </a:p>
         </p:txBody>
       </p:sp>
@@ -11951,6 +12025,112 @@
       </p:grpSpPr>
       <p:sp>
         <p:nvSpPr>
+          <p:cNvPr id="4" name="Slide Number Placeholder 3">
+            <a:extLst>
+              <a:ext uri="{FF2B5EF4-FFF2-40B4-BE49-F238E27FC236}">
+                <a16:creationId xmlns:a16="http://schemas.microsoft.com/office/drawing/2014/main" id="{2EA1AED6-5238-21B7-B855-D4490187184E}"/>
+              </a:ext>
+            </a:extLst>
+          </p:cNvPr>
+          <p:cNvSpPr>
+            <a:spLocks noGrp="1"/>
+          </p:cNvSpPr>
+          <p:nvPr>
+            <p:ph type="sldNum" sz="quarter" idx="12"/>
+          </p:nvPr>
+        </p:nvSpPr>
+        <p:spPr/>
+        <p:txBody>
+          <a:bodyPr/>
+          <a:lstStyle/>
+          <a:p>
+            <a:fld id="{ADDEFC8A-584C-5E41-A633-418C2FB73F75}" type="slidenum">
+              <a:rPr lang="en-DE" smtClean="0"/>
+              <a:t>22</a:t>
+            </a:fld>
+            <a:endParaRPr lang="en-DE"/>
+          </a:p>
+        </p:txBody>
+      </p:sp>
+      <p:pic>
+        <p:nvPicPr>
+          <p:cNvPr id="1026" name="Picture 2" descr="Ensemble Learning: Bagging &amp; Boosting | by Fernando López | Towards ...">
+            <a:extLst>
+              <a:ext uri="{FF2B5EF4-FFF2-40B4-BE49-F238E27FC236}">
+                <a16:creationId xmlns:a16="http://schemas.microsoft.com/office/drawing/2014/main" id="{185C8C33-5975-C3CD-7DBE-9F6CC0596D98}"/>
+              </a:ext>
+            </a:extLst>
+          </p:cNvPr>
+          <p:cNvPicPr>
+            <a:picLocks noChangeAspect="1" noChangeArrowheads="1"/>
+          </p:cNvPicPr>
+          <p:nvPr/>
+        </p:nvPicPr>
+        <p:blipFill>
+          <a:blip r:embed="rId2">
+            <a:extLst>
+              <a:ext uri="{28A0092B-C50C-407E-A947-70E740481C1C}">
+                <a14:useLocalDpi xmlns:a14="http://schemas.microsoft.com/office/drawing/2010/main" val="0"/>
+              </a:ext>
+            </a:extLst>
+          </a:blip>
+          <a:srcRect/>
+          <a:stretch>
+            <a:fillRect/>
+          </a:stretch>
+        </p:blipFill>
+        <p:spPr bwMode="auto">
+          <a:xfrm>
+            <a:off x="0" y="0"/>
+            <a:ext cx="12192000" cy="6858000"/>
+          </a:xfrm>
+          <a:prstGeom prst="rect">
+            <a:avLst/>
+          </a:prstGeom>
+          <a:noFill/>
+          <a:extLst>
+            <a:ext uri="{909E8E84-426E-40DD-AFC4-6F175D3DCCD1}">
+              <a14:hiddenFill xmlns:a14="http://schemas.microsoft.com/office/drawing/2010/main">
+                <a:solidFill>
+                  <a:srgbClr val="FFFFFF"/>
+                </a:solidFill>
+              </a14:hiddenFill>
+            </a:ext>
+          </a:extLst>
+        </p:spPr>
+      </p:pic>
+    </p:spTree>
+    <p:extLst>
+      <p:ext uri="{BB962C8B-B14F-4D97-AF65-F5344CB8AC3E}">
+        <p14:creationId xmlns:p14="http://schemas.microsoft.com/office/powerpoint/2010/main" val="2404063692"/>
+      </p:ext>
+    </p:extLst>
+  </p:cSld>
+  <p:clrMapOvr>
+    <a:masterClrMapping/>
+  </p:clrMapOvr>
+</p:sld>
+</file>
+
+<file path=ppt/slides/slide23.xml><?xml version="1.0" encoding="utf-8"?>
+<p:sld xmlns:a="http://schemas.openxmlformats.org/drawingml/2006/main" xmlns:r="http://schemas.openxmlformats.org/officeDocument/2006/relationships" xmlns:p="http://schemas.openxmlformats.org/presentationml/2006/main">
+  <p:cSld>
+    <p:spTree>
+      <p:nvGrpSpPr>
+        <p:cNvPr id="1" name=""/>
+        <p:cNvGrpSpPr/>
+        <p:nvPr/>
+      </p:nvGrpSpPr>
+      <p:grpSpPr>
+        <a:xfrm>
+          <a:off x="0" y="0"/>
+          <a:ext cx="0" cy="0"/>
+          <a:chOff x="0" y="0"/>
+          <a:chExt cx="0" cy="0"/>
+        </a:xfrm>
+      </p:grpSpPr>
+      <p:sp>
+        <p:nvSpPr>
           <p:cNvPr id="2" name="Title 1">
             <a:extLst>
               <a:ext uri="{FF2B5EF4-FFF2-40B4-BE49-F238E27FC236}">
@@ -12158,7 +12338,7 @@
           <a:p>
             <a:fld id="{4D06B799-84A7-8648-BC90-ED3C95C2198D}" type="slidenum">
               <a:rPr lang="en-DE" smtClean="0"/>
-              <a:t>22</a:t>
+              <a:t>23</a:t>
             </a:fld>
             <a:endParaRPr lang="en-DE"/>
           </a:p>
@@ -12168,157 +12348,6 @@
     <p:extLst>
       <p:ext uri="{BB962C8B-B14F-4D97-AF65-F5344CB8AC3E}">
         <p14:creationId xmlns:p14="http://schemas.microsoft.com/office/powerpoint/2010/main" val="1898373171"/>
-      </p:ext>
-    </p:extLst>
-  </p:cSld>
-  <p:clrMapOvr>
-    <a:masterClrMapping/>
-  </p:clrMapOvr>
-</p:sld>
-</file>
-
-<file path=ppt/slides/slide23.xml><?xml version="1.0" encoding="utf-8"?>
-<p:sld xmlns:a="http://schemas.openxmlformats.org/drawingml/2006/main" xmlns:r="http://schemas.openxmlformats.org/officeDocument/2006/relationships" xmlns:p="http://schemas.openxmlformats.org/presentationml/2006/main">
-  <p:cSld>
-    <p:spTree>
-      <p:nvGrpSpPr>
-        <p:cNvPr id="1" name=""/>
-        <p:cNvGrpSpPr/>
-        <p:nvPr/>
-      </p:nvGrpSpPr>
-      <p:grpSpPr>
-        <a:xfrm>
-          <a:off x="0" y="0"/>
-          <a:ext cx="0" cy="0"/>
-          <a:chOff x="0" y="0"/>
-          <a:chExt cx="0" cy="0"/>
-        </a:xfrm>
-      </p:grpSpPr>
-      <p:sp>
-        <p:nvSpPr>
-          <p:cNvPr id="2" name="Title 1">
-            <a:extLst>
-              <a:ext uri="{FF2B5EF4-FFF2-40B4-BE49-F238E27FC236}">
-                <a16:creationId xmlns:a16="http://schemas.microsoft.com/office/drawing/2014/main" id="{9F51148D-1862-FF84-978A-D2B00915FA83}"/>
-              </a:ext>
-            </a:extLst>
-          </p:cNvPr>
-          <p:cNvSpPr>
-            <a:spLocks noGrp="1"/>
-          </p:cNvSpPr>
-          <p:nvPr>
-            <p:ph type="title"/>
-          </p:nvPr>
-        </p:nvSpPr>
-        <p:spPr/>
-        <p:txBody>
-          <a:bodyPr/>
-          <a:lstStyle/>
-          <a:p>
-            <a:r>
-              <a:rPr lang="en-GB" dirty="0"/>
-              <a:t>So, let’s do some </a:t>
-            </a:r>
-            <a:r>
-              <a:rPr lang="en-GB" dirty="0" err="1"/>
-              <a:t>modeling</a:t>
-            </a:r>
-            <a:r>
-              <a:rPr lang="en-GB" dirty="0"/>
-              <a:t> …</a:t>
-            </a:r>
-          </a:p>
-        </p:txBody>
-      </p:sp>
-      <p:sp>
-        <p:nvSpPr>
-          <p:cNvPr id="3" name="Content Placeholder 2">
-            <a:extLst>
-              <a:ext uri="{FF2B5EF4-FFF2-40B4-BE49-F238E27FC236}">
-                <a16:creationId xmlns:a16="http://schemas.microsoft.com/office/drawing/2014/main" id="{F2E073A6-59AB-4CA7-ABDE-14DB7A89B21D}"/>
-              </a:ext>
-            </a:extLst>
-          </p:cNvPr>
-          <p:cNvSpPr>
-            <a:spLocks noGrp="1"/>
-          </p:cNvSpPr>
-          <p:nvPr>
-            <p:ph idx="1"/>
-          </p:nvPr>
-        </p:nvSpPr>
-        <p:spPr/>
-        <p:txBody>
-          <a:bodyPr/>
-          <a:lstStyle/>
-          <a:p>
-            <a:pPr marL="0" indent="0">
-              <a:buNone/>
-            </a:pPr>
-            <a:r>
-              <a:rPr lang="en-GB" dirty="0">
-                <a:hlinkClick r:id="rId2"/>
-              </a:rPr>
-              <a:t>scikit-learn</a:t>
-            </a:r>
-            <a:endParaRPr lang="en-GB" dirty="0"/>
-          </a:p>
-          <a:p>
-            <a:pPr marL="0" indent="0">
-              <a:buNone/>
-            </a:pPr>
-            <a:endParaRPr lang="en-GB" dirty="0"/>
-          </a:p>
-          <a:p>
-            <a:pPr marL="0" indent="0">
-              <a:buNone/>
-            </a:pPr>
-            <a:r>
-              <a:rPr lang="en-GB" dirty="0"/>
-              <a:t>coding example: </a:t>
-            </a:r>
-            <a:r>
-              <a:rPr lang="en-GB" dirty="0">
-                <a:hlinkClick r:id="rId3"/>
-              </a:rPr>
-              <a:t>Kaggle House Prices</a:t>
-            </a:r>
-            <a:endParaRPr lang="en-GB" dirty="0"/>
-          </a:p>
-        </p:txBody>
-      </p:sp>
-      <p:sp>
-        <p:nvSpPr>
-          <p:cNvPr id="4" name="Slide Number Placeholder 3">
-            <a:extLst>
-              <a:ext uri="{FF2B5EF4-FFF2-40B4-BE49-F238E27FC236}">
-                <a16:creationId xmlns:a16="http://schemas.microsoft.com/office/drawing/2014/main" id="{D639767A-556E-C57D-DE45-60A8C6B65F86}"/>
-              </a:ext>
-            </a:extLst>
-          </p:cNvPr>
-          <p:cNvSpPr>
-            <a:spLocks noGrp="1"/>
-          </p:cNvSpPr>
-          <p:nvPr>
-            <p:ph type="sldNum" sz="quarter" idx="12"/>
-          </p:nvPr>
-        </p:nvSpPr>
-        <p:spPr/>
-        <p:txBody>
-          <a:bodyPr/>
-          <a:lstStyle/>
-          <a:p>
-            <a:fld id="{ADDEFC8A-584C-5E41-A633-418C2FB73F75}" type="slidenum">
-              <a:rPr lang="en-DE" smtClean="0"/>
-              <a:t>23</a:t>
-            </a:fld>
-            <a:endParaRPr lang="en-DE"/>
-          </a:p>
-        </p:txBody>
-      </p:sp>
-    </p:spTree>
-    <p:extLst>
-      <p:ext uri="{BB962C8B-B14F-4D97-AF65-F5344CB8AC3E}">
-        <p14:creationId xmlns:p14="http://schemas.microsoft.com/office/powerpoint/2010/main" val="4139974002"/>
       </p:ext>
     </p:extLst>
   </p:cSld>
@@ -12350,7 +12379,7 @@
           <p:cNvPr id="2" name="Title 1">
             <a:extLst>
               <a:ext uri="{FF2B5EF4-FFF2-40B4-BE49-F238E27FC236}">
-                <a16:creationId xmlns:a16="http://schemas.microsoft.com/office/drawing/2014/main" id="{8D8B05A3-F058-6790-2884-26EB8B8A562A}"/>
+                <a16:creationId xmlns:a16="http://schemas.microsoft.com/office/drawing/2014/main" id="{9F51148D-1862-FF84-978A-D2B00915FA83}"/>
               </a:ext>
             </a:extLst>
           </p:cNvPr>
@@ -12368,7 +12397,15 @@
           <a:p>
             <a:r>
               <a:rPr lang="en-GB" dirty="0"/>
-              <a:t>Assignments</a:t>
+              <a:t>So, let’s do some </a:t>
+            </a:r>
+            <a:r>
+              <a:rPr lang="en-GB" dirty="0" err="1"/>
+              <a:t>modeling</a:t>
+            </a:r>
+            <a:r>
+              <a:rPr lang="en-GB" dirty="0"/>
+              <a:t> …</a:t>
             </a:r>
           </a:p>
         </p:txBody>
@@ -12378,7 +12415,7 @@
           <p:cNvPr id="3" name="Content Placeholder 2">
             <a:extLst>
               <a:ext uri="{FF2B5EF4-FFF2-40B4-BE49-F238E27FC236}">
-                <a16:creationId xmlns:a16="http://schemas.microsoft.com/office/drawing/2014/main" id="{01BFA021-F249-3A9A-8A73-A200BC368993}"/>
+                <a16:creationId xmlns:a16="http://schemas.microsoft.com/office/drawing/2014/main" id="{F2E073A6-59AB-4CA7-ABDE-14DB7A89B21D}"/>
               </a:ext>
             </a:extLst>
           </p:cNvPr>
@@ -12394,15 +12431,14 @@
           <a:bodyPr/>
           <a:lstStyle/>
           <a:p>
-            <a:r>
-              <a:rPr lang="en-GB" dirty="0"/>
-              <a:t>classification: </a:t>
-            </a:r>
+            <a:pPr marL="0" indent="0">
+              <a:buNone/>
+            </a:pPr>
             <a:r>
               <a:rPr lang="en-GB" dirty="0">
                 <a:hlinkClick r:id="rId2"/>
               </a:rPr>
-              <a:t>Kaggle Spaceship Titanic</a:t>
+              <a:t>scikit-learn</a:t>
             </a:r>
             <a:endParaRPr lang="en-GB" dirty="0"/>
           </a:p>
@@ -12413,15 +12449,18 @@
             <a:endParaRPr lang="en-GB" dirty="0"/>
           </a:p>
           <a:p>
+            <a:pPr marL="0" indent="0">
+              <a:buNone/>
+            </a:pPr>
             <a:r>
               <a:rPr lang="en-GB" dirty="0"/>
-              <a:t>regression: </a:t>
+              <a:t>coding example: </a:t>
             </a:r>
             <a:r>
               <a:rPr lang="en-GB" dirty="0">
                 <a:hlinkClick r:id="rId3"/>
               </a:rPr>
-              <a:t>Kaggle Store Sales</a:t>
+              <a:t>Kaggle House Prices</a:t>
             </a:r>
             <a:endParaRPr lang="en-GB" dirty="0"/>
           </a:p>
@@ -12432,7 +12471,7 @@
           <p:cNvPr id="4" name="Slide Number Placeholder 3">
             <a:extLst>
               <a:ext uri="{FF2B5EF4-FFF2-40B4-BE49-F238E27FC236}">
-                <a16:creationId xmlns:a16="http://schemas.microsoft.com/office/drawing/2014/main" id="{E12A9BAF-B74E-28AF-DD3F-0B03417FE9E7}"/>
+                <a16:creationId xmlns:a16="http://schemas.microsoft.com/office/drawing/2014/main" id="{D639767A-556E-C57D-DE45-60A8C6B65F86}"/>
               </a:ext>
             </a:extLst>
           </p:cNvPr>
@@ -12451,6 +12490,147 @@
             <a:fld id="{ADDEFC8A-584C-5E41-A633-418C2FB73F75}" type="slidenum">
               <a:rPr lang="en-DE" smtClean="0"/>
               <a:t>24</a:t>
+            </a:fld>
+            <a:endParaRPr lang="en-DE"/>
+          </a:p>
+        </p:txBody>
+      </p:sp>
+    </p:spTree>
+    <p:extLst>
+      <p:ext uri="{BB962C8B-B14F-4D97-AF65-F5344CB8AC3E}">
+        <p14:creationId xmlns:p14="http://schemas.microsoft.com/office/powerpoint/2010/main" val="4139974002"/>
+      </p:ext>
+    </p:extLst>
+  </p:cSld>
+  <p:clrMapOvr>
+    <a:masterClrMapping/>
+  </p:clrMapOvr>
+</p:sld>
+</file>
+
+<file path=ppt/slides/slide25.xml><?xml version="1.0" encoding="utf-8"?>
+<p:sld xmlns:a="http://schemas.openxmlformats.org/drawingml/2006/main" xmlns:r="http://schemas.openxmlformats.org/officeDocument/2006/relationships" xmlns:p="http://schemas.openxmlformats.org/presentationml/2006/main">
+  <p:cSld>
+    <p:spTree>
+      <p:nvGrpSpPr>
+        <p:cNvPr id="1" name=""/>
+        <p:cNvGrpSpPr/>
+        <p:nvPr/>
+      </p:nvGrpSpPr>
+      <p:grpSpPr>
+        <a:xfrm>
+          <a:off x="0" y="0"/>
+          <a:ext cx="0" cy="0"/>
+          <a:chOff x="0" y="0"/>
+          <a:chExt cx="0" cy="0"/>
+        </a:xfrm>
+      </p:grpSpPr>
+      <p:sp>
+        <p:nvSpPr>
+          <p:cNvPr id="2" name="Title 1">
+            <a:extLst>
+              <a:ext uri="{FF2B5EF4-FFF2-40B4-BE49-F238E27FC236}">
+                <a16:creationId xmlns:a16="http://schemas.microsoft.com/office/drawing/2014/main" id="{8D8B05A3-F058-6790-2884-26EB8B8A562A}"/>
+              </a:ext>
+            </a:extLst>
+          </p:cNvPr>
+          <p:cNvSpPr>
+            <a:spLocks noGrp="1"/>
+          </p:cNvSpPr>
+          <p:nvPr>
+            <p:ph type="title"/>
+          </p:nvPr>
+        </p:nvSpPr>
+        <p:spPr/>
+        <p:txBody>
+          <a:bodyPr/>
+          <a:lstStyle/>
+          <a:p>
+            <a:r>
+              <a:rPr lang="en-GB" dirty="0"/>
+              <a:t>Assignments</a:t>
+            </a:r>
+          </a:p>
+        </p:txBody>
+      </p:sp>
+      <p:sp>
+        <p:nvSpPr>
+          <p:cNvPr id="3" name="Content Placeholder 2">
+            <a:extLst>
+              <a:ext uri="{FF2B5EF4-FFF2-40B4-BE49-F238E27FC236}">
+                <a16:creationId xmlns:a16="http://schemas.microsoft.com/office/drawing/2014/main" id="{01BFA021-F249-3A9A-8A73-A200BC368993}"/>
+              </a:ext>
+            </a:extLst>
+          </p:cNvPr>
+          <p:cNvSpPr>
+            <a:spLocks noGrp="1"/>
+          </p:cNvSpPr>
+          <p:nvPr>
+            <p:ph idx="1"/>
+          </p:nvPr>
+        </p:nvSpPr>
+        <p:spPr/>
+        <p:txBody>
+          <a:bodyPr/>
+          <a:lstStyle/>
+          <a:p>
+            <a:r>
+              <a:rPr lang="en-GB" dirty="0"/>
+              <a:t>classification: </a:t>
+            </a:r>
+            <a:r>
+              <a:rPr lang="en-GB" dirty="0">
+                <a:hlinkClick r:id="rId2"/>
+              </a:rPr>
+              <a:t>Kaggle Spaceship Titanic</a:t>
+            </a:r>
+            <a:endParaRPr lang="en-GB" dirty="0"/>
+          </a:p>
+          <a:p>
+            <a:pPr marL="0" indent="0">
+              <a:buNone/>
+            </a:pPr>
+            <a:endParaRPr lang="en-GB" dirty="0"/>
+          </a:p>
+          <a:p>
+            <a:r>
+              <a:rPr lang="en-GB" dirty="0"/>
+              <a:t>regression: </a:t>
+            </a:r>
+            <a:r>
+              <a:rPr lang="en-GB" dirty="0">
+                <a:hlinkClick r:id="rId3"/>
+              </a:rPr>
+              <a:t>Kaggle Store Sales</a:t>
+            </a:r>
+            <a:endParaRPr lang="en-GB" dirty="0"/>
+          </a:p>
+        </p:txBody>
+      </p:sp>
+      <p:sp>
+        <p:nvSpPr>
+          <p:cNvPr id="4" name="Slide Number Placeholder 3">
+            <a:extLst>
+              <a:ext uri="{FF2B5EF4-FFF2-40B4-BE49-F238E27FC236}">
+                <a16:creationId xmlns:a16="http://schemas.microsoft.com/office/drawing/2014/main" id="{E12A9BAF-B74E-28AF-DD3F-0B03417FE9E7}"/>
+              </a:ext>
+            </a:extLst>
+          </p:cNvPr>
+          <p:cNvSpPr>
+            <a:spLocks noGrp="1"/>
+          </p:cNvSpPr>
+          <p:nvPr>
+            <p:ph type="sldNum" sz="quarter" idx="12"/>
+          </p:nvPr>
+        </p:nvSpPr>
+        <p:spPr/>
+        <p:txBody>
+          <a:bodyPr/>
+          <a:lstStyle/>
+          <a:p>
+            <a:fld id="{ADDEFC8A-584C-5E41-A633-418C2FB73F75}" type="slidenum">
+              <a:rPr lang="en-DE" smtClean="0"/>
+              <a:t>25</a:t>
             </a:fld>
             <a:endParaRPr lang="en-DE"/>
           </a:p>

</xml_diff>